<commit_message>
Email and Password Reset
</commit_message>
<xml_diff>
--- a/Study/09. Pagination/Pagination.pptx
+++ b/Study/09. Pagination/Pagination.pptx
@@ -838,7 +838,7 @@
           <a:p>
             <a:fld id="{B6FB7DCD-5BA3-48A2-BE8C-591555253DD2}" type="datetimeFigureOut">
               <a:rPr lang="ko-KR" altLang="en-US" smtClean="0"/>
-              <a:t>2020-07-02</a:t>
+              <a:t>2020-07-03</a:t>
             </a:fld>
             <a:endParaRPr lang="ko-KR" altLang="en-US"/>
           </a:p>
@@ -1089,7 +1089,7 @@
           <a:p>
             <a:fld id="{B6FB7DCD-5BA3-48A2-BE8C-591555253DD2}" type="datetimeFigureOut">
               <a:rPr lang="ko-KR" altLang="en-US" smtClean="0"/>
-              <a:t>2020-07-02</a:t>
+              <a:t>2020-07-03</a:t>
             </a:fld>
             <a:endParaRPr lang="ko-KR" altLang="en-US"/>
           </a:p>
@@ -1403,7 +1403,7 @@
           <a:p>
             <a:fld id="{B6FB7DCD-5BA3-48A2-BE8C-591555253DD2}" type="datetimeFigureOut">
               <a:rPr lang="ko-KR" altLang="en-US" smtClean="0"/>
-              <a:t>2020-07-02</a:t>
+              <a:t>2020-07-03</a:t>
             </a:fld>
             <a:endParaRPr lang="ko-KR" altLang="en-US"/>
           </a:p>
@@ -1744,7 +1744,7 @@
           <a:p>
             <a:fld id="{B6FB7DCD-5BA3-48A2-BE8C-591555253DD2}" type="datetimeFigureOut">
               <a:rPr lang="ko-KR" altLang="en-US" smtClean="0"/>
-              <a:t>2020-07-02</a:t>
+              <a:t>2020-07-03</a:t>
             </a:fld>
             <a:endParaRPr lang="ko-KR" altLang="en-US"/>
           </a:p>
@@ -2058,7 +2058,7 @@
           <a:p>
             <a:fld id="{B6FB7DCD-5BA3-48A2-BE8C-591555253DD2}" type="datetimeFigureOut">
               <a:rPr lang="ko-KR" altLang="en-US" smtClean="0"/>
-              <a:t>2020-07-02</a:t>
+              <a:t>2020-07-03</a:t>
             </a:fld>
             <a:endParaRPr lang="ko-KR" altLang="en-US"/>
           </a:p>
@@ -2451,7 +2451,7 @@
           <a:p>
             <a:fld id="{B6FB7DCD-5BA3-48A2-BE8C-591555253DD2}" type="datetimeFigureOut">
               <a:rPr lang="ko-KR" altLang="en-US" smtClean="0"/>
-              <a:t>2020-07-02</a:t>
+              <a:t>2020-07-03</a:t>
             </a:fld>
             <a:endParaRPr lang="ko-KR" altLang="en-US"/>
           </a:p>
@@ -2621,7 +2621,7 @@
           <a:p>
             <a:fld id="{B6FB7DCD-5BA3-48A2-BE8C-591555253DD2}" type="datetimeFigureOut">
               <a:rPr lang="ko-KR" altLang="en-US" smtClean="0"/>
-              <a:t>2020-07-02</a:t>
+              <a:t>2020-07-03</a:t>
             </a:fld>
             <a:endParaRPr lang="ko-KR" altLang="en-US"/>
           </a:p>
@@ -2801,7 +2801,7 @@
           <a:p>
             <a:fld id="{B6FB7DCD-5BA3-48A2-BE8C-591555253DD2}" type="datetimeFigureOut">
               <a:rPr lang="ko-KR" altLang="en-US" smtClean="0"/>
-              <a:t>2020-07-02</a:t>
+              <a:t>2020-07-03</a:t>
             </a:fld>
             <a:endParaRPr lang="ko-KR" altLang="en-US"/>
           </a:p>
@@ -2977,7 +2977,7 @@
           <a:p>
             <a:fld id="{B6FB7DCD-5BA3-48A2-BE8C-591555253DD2}" type="datetimeFigureOut">
               <a:rPr lang="ko-KR" altLang="en-US" smtClean="0"/>
-              <a:t>2020-07-02</a:t>
+              <a:t>2020-07-03</a:t>
             </a:fld>
             <a:endParaRPr lang="ko-KR" altLang="en-US"/>
           </a:p>
@@ -3224,7 +3224,7 @@
           <a:p>
             <a:fld id="{B6FB7DCD-5BA3-48A2-BE8C-591555253DD2}" type="datetimeFigureOut">
               <a:rPr lang="ko-KR" altLang="en-US" smtClean="0"/>
-              <a:t>2020-07-02</a:t>
+              <a:t>2020-07-03</a:t>
             </a:fld>
             <a:endParaRPr lang="ko-KR" altLang="en-US"/>
           </a:p>
@@ -3456,7 +3456,7 @@
           <a:p>
             <a:fld id="{B6FB7DCD-5BA3-48A2-BE8C-591555253DD2}" type="datetimeFigureOut">
               <a:rPr lang="ko-KR" altLang="en-US" smtClean="0"/>
-              <a:t>2020-07-02</a:t>
+              <a:t>2020-07-03</a:t>
             </a:fld>
             <a:endParaRPr lang="ko-KR" altLang="en-US"/>
           </a:p>
@@ -3830,7 +3830,7 @@
           <a:p>
             <a:fld id="{B6FB7DCD-5BA3-48A2-BE8C-591555253DD2}" type="datetimeFigureOut">
               <a:rPr lang="ko-KR" altLang="en-US" smtClean="0"/>
-              <a:t>2020-07-02</a:t>
+              <a:t>2020-07-03</a:t>
             </a:fld>
             <a:endParaRPr lang="ko-KR" altLang="en-US"/>
           </a:p>
@@ -3953,7 +3953,7 @@
           <a:p>
             <a:fld id="{B6FB7DCD-5BA3-48A2-BE8C-591555253DD2}" type="datetimeFigureOut">
               <a:rPr lang="ko-KR" altLang="en-US" smtClean="0"/>
-              <a:t>2020-07-02</a:t>
+              <a:t>2020-07-03</a:t>
             </a:fld>
             <a:endParaRPr lang="ko-KR" altLang="en-US"/>
           </a:p>
@@ -4048,7 +4048,7 @@
           <a:p>
             <a:fld id="{B6FB7DCD-5BA3-48A2-BE8C-591555253DD2}" type="datetimeFigureOut">
               <a:rPr lang="ko-KR" altLang="en-US" smtClean="0"/>
-              <a:t>2020-07-02</a:t>
+              <a:t>2020-07-03</a:t>
             </a:fld>
             <a:endParaRPr lang="ko-KR" altLang="en-US"/>
           </a:p>
@@ -4303,7 +4303,7 @@
           <a:p>
             <a:fld id="{B6FB7DCD-5BA3-48A2-BE8C-591555253DD2}" type="datetimeFigureOut">
               <a:rPr lang="ko-KR" altLang="en-US" smtClean="0"/>
-              <a:t>2020-07-02</a:t>
+              <a:t>2020-07-03</a:t>
             </a:fld>
             <a:endParaRPr lang="ko-KR" altLang="en-US"/>
           </a:p>
@@ -4566,7 +4566,7 @@
           <a:p>
             <a:fld id="{B6FB7DCD-5BA3-48A2-BE8C-591555253DD2}" type="datetimeFigureOut">
               <a:rPr lang="ko-KR" altLang="en-US" smtClean="0"/>
-              <a:t>2020-07-02</a:t>
+              <a:t>2020-07-03</a:t>
             </a:fld>
             <a:endParaRPr lang="ko-KR" altLang="en-US"/>
           </a:p>
@@ -5309,7 +5309,7 @@
           <a:p>
             <a:fld id="{B6FB7DCD-5BA3-48A2-BE8C-591555253DD2}" type="datetimeFigureOut">
               <a:rPr lang="ko-KR" altLang="en-US" smtClean="0"/>
-              <a:t>2020-07-02</a:t>
+              <a:t>2020-07-03</a:t>
             </a:fld>
             <a:endParaRPr lang="ko-KR" altLang="en-US"/>
           </a:p>
@@ -6247,6 +6247,66 @@
           </a:p>
         </p:txBody>
       </p:sp>
+      <p:pic>
+        <p:nvPicPr>
+          <p:cNvPr id="3" name="그림 2">
+            <a:extLst>
+              <a:ext uri="{FF2B5EF4-FFF2-40B4-BE49-F238E27FC236}">
+                <a16:creationId xmlns:a16="http://schemas.microsoft.com/office/drawing/2014/main" id="{6B77073F-5551-490B-B135-F04F5DAB5D2E}"/>
+              </a:ext>
+            </a:extLst>
+          </p:cNvPr>
+          <p:cNvPicPr>
+            <a:picLocks noChangeAspect="1"/>
+          </p:cNvPicPr>
+          <p:nvPr/>
+        </p:nvPicPr>
+        <p:blipFill>
+          <a:blip r:embed="rId2"/>
+          <a:stretch>
+            <a:fillRect/>
+          </a:stretch>
+        </p:blipFill>
+        <p:spPr>
+          <a:xfrm>
+            <a:off x="263645" y="1876208"/>
+            <a:ext cx="7170826" cy="1359122"/>
+          </a:xfrm>
+          <a:prstGeom prst="rect">
+            <a:avLst/>
+          </a:prstGeom>
+        </p:spPr>
+      </p:pic>
+      <p:pic>
+        <p:nvPicPr>
+          <p:cNvPr id="4" name="그림 3">
+            <a:extLst>
+              <a:ext uri="{FF2B5EF4-FFF2-40B4-BE49-F238E27FC236}">
+                <a16:creationId xmlns:a16="http://schemas.microsoft.com/office/drawing/2014/main" id="{045F0BCB-9C0B-4D97-B04D-3719CDC3E145}"/>
+              </a:ext>
+            </a:extLst>
+          </p:cNvPr>
+          <p:cNvPicPr>
+            <a:picLocks noChangeAspect="1"/>
+          </p:cNvPicPr>
+          <p:nvPr/>
+        </p:nvPicPr>
+        <p:blipFill>
+          <a:blip r:embed="rId3"/>
+          <a:stretch>
+            <a:fillRect/>
+          </a:stretch>
+        </p:blipFill>
+        <p:spPr>
+          <a:xfrm>
+            <a:off x="263645" y="3984074"/>
+            <a:ext cx="6649378" cy="2133898"/>
+          </a:xfrm>
+          <a:prstGeom prst="rect">
+            <a:avLst/>
+          </a:prstGeom>
+        </p:spPr>
+      </p:pic>
     </p:spTree>
     <p:extLst>
       <p:ext uri="{BB962C8B-B14F-4D97-AF65-F5344CB8AC3E}">
@@ -6518,6 +6578,66 @@
           </a:p>
         </p:txBody>
       </p:sp>
+      <p:pic>
+        <p:nvPicPr>
+          <p:cNvPr id="3" name="그림 2">
+            <a:extLst>
+              <a:ext uri="{FF2B5EF4-FFF2-40B4-BE49-F238E27FC236}">
+                <a16:creationId xmlns:a16="http://schemas.microsoft.com/office/drawing/2014/main" id="{3094F7D3-A363-4454-88C8-EC980E257AB1}"/>
+              </a:ext>
+            </a:extLst>
+          </p:cNvPr>
+          <p:cNvPicPr>
+            <a:picLocks noChangeAspect="1"/>
+          </p:cNvPicPr>
+          <p:nvPr/>
+        </p:nvPicPr>
+        <p:blipFill>
+          <a:blip r:embed="rId2"/>
+          <a:stretch>
+            <a:fillRect/>
+          </a:stretch>
+        </p:blipFill>
+        <p:spPr>
+          <a:xfrm>
+            <a:off x="303991" y="1625818"/>
+            <a:ext cx="7316883" cy="3291394"/>
+          </a:xfrm>
+          <a:prstGeom prst="rect">
+            <a:avLst/>
+          </a:prstGeom>
+        </p:spPr>
+      </p:pic>
+      <p:pic>
+        <p:nvPicPr>
+          <p:cNvPr id="4" name="그림 3">
+            <a:extLst>
+              <a:ext uri="{FF2B5EF4-FFF2-40B4-BE49-F238E27FC236}">
+                <a16:creationId xmlns:a16="http://schemas.microsoft.com/office/drawing/2014/main" id="{BF0C8487-AA91-462B-8594-EDDAE5951A1D}"/>
+              </a:ext>
+            </a:extLst>
+          </p:cNvPr>
+          <p:cNvPicPr>
+            <a:picLocks noChangeAspect="1"/>
+          </p:cNvPicPr>
+          <p:nvPr/>
+        </p:nvPicPr>
+        <p:blipFill>
+          <a:blip r:embed="rId3"/>
+          <a:stretch>
+            <a:fillRect/>
+          </a:stretch>
+        </p:blipFill>
+        <p:spPr>
+          <a:xfrm>
+            <a:off x="408316" y="4955669"/>
+            <a:ext cx="7212558" cy="2222738"/>
+          </a:xfrm>
+          <a:prstGeom prst="rect">
+            <a:avLst/>
+          </a:prstGeom>
+        </p:spPr>
+      </p:pic>
     </p:spTree>
     <p:extLst>
       <p:ext uri="{BB962C8B-B14F-4D97-AF65-F5344CB8AC3E}">
@@ -6789,6 +6909,36 @@
           </a:p>
         </p:txBody>
       </p:sp>
+      <p:pic>
+        <p:nvPicPr>
+          <p:cNvPr id="3" name="그림 2">
+            <a:extLst>
+              <a:ext uri="{FF2B5EF4-FFF2-40B4-BE49-F238E27FC236}">
+                <a16:creationId xmlns:a16="http://schemas.microsoft.com/office/drawing/2014/main" id="{8A9B7E1F-B8F4-473B-9957-05AD5B63B5DF}"/>
+              </a:ext>
+            </a:extLst>
+          </p:cNvPr>
+          <p:cNvPicPr>
+            <a:picLocks noChangeAspect="1"/>
+          </p:cNvPicPr>
+          <p:nvPr/>
+        </p:nvPicPr>
+        <p:blipFill>
+          <a:blip r:embed="rId2"/>
+          <a:stretch>
+            <a:fillRect/>
+          </a:stretch>
+        </p:blipFill>
+        <p:spPr>
+          <a:xfrm>
+            <a:off x="340689" y="2196693"/>
+            <a:ext cx="7280185" cy="3327091"/>
+          </a:xfrm>
+          <a:prstGeom prst="rect">
+            <a:avLst/>
+          </a:prstGeom>
+        </p:spPr>
+      </p:pic>
     </p:spTree>
     <p:extLst>
       <p:ext uri="{BB962C8B-B14F-4D97-AF65-F5344CB8AC3E}">

</xml_diff>